<commit_message>
ppt finished. need to add table
</commit_message>
<xml_diff>
--- a/InformatiTekRFP.pptx
+++ b/InformatiTekRFP.pptx
@@ -5,20 +5,21 @@
     <p:sldMasterId id="2147483769" r:id="rId4"/>
   </p:sldMasterIdLst>
   <p:notesMasterIdLst>
-    <p:notesMasterId r:id="rId13"/>
+    <p:notesMasterId r:id="rId14"/>
   </p:notesMasterIdLst>
   <p:handoutMasterIdLst>
-    <p:handoutMasterId r:id="rId14"/>
+    <p:handoutMasterId r:id="rId15"/>
   </p:handoutMasterIdLst>
   <p:sldIdLst>
     <p:sldId id="330" r:id="rId5"/>
     <p:sldId id="344" r:id="rId6"/>
     <p:sldId id="354" r:id="rId7"/>
-    <p:sldId id="355" r:id="rId8"/>
-    <p:sldId id="356" r:id="rId9"/>
-    <p:sldId id="357" r:id="rId10"/>
+    <p:sldId id="361" r:id="rId8"/>
+    <p:sldId id="355" r:id="rId9"/>
+    <p:sldId id="356" r:id="rId10"/>
     <p:sldId id="360" r:id="rId11"/>
-    <p:sldId id="332" r:id="rId12"/>
+    <p:sldId id="362" r:id="rId12"/>
+    <p:sldId id="332" r:id="rId13"/>
   </p:sldIdLst>
   <p:sldSz cx="9144000" cy="5143500" type="screen16x9"/>
   <p:notesSz cx="6950075" cy="9236075"/>
@@ -849,7 +850,7 @@
           <a:p>
             <a:fld id="{2455D1DE-A7B1-4046-BEEF-D8F8EFF4F403}" type="slidenum">
               <a:rPr lang="en-US" smtClean="0"/>
-              <a:t>4</a:t>
+              <a:t>5</a:t>
             </a:fld>
             <a:endParaRPr lang="en-US" dirty="0"/>
           </a:p>
@@ -13776,7 +13777,7 @@
             </a:r>
             <a:r>
               <a:rPr lang="en-US" dirty="0"/>
-              <a:t>Demonstrate how the combination of Alteryx and Tableau are a more user friendly alternative to D3.js</a:t>
+              <a:t>Demonstrate how the combination of Alteryx and Tableau are a more user friendly alternative to D3.js </a:t>
             </a:r>
           </a:p>
         </p:txBody>
@@ -14315,8 +14316,76 @@
           <a:p>
             <a:r>
               <a:rPr lang="en-US" dirty="0"/>
-              <a:t>Alteryx</a:t>
-            </a:r>
+              <a:t>Question to Answer</a:t>
+            </a:r>
+          </a:p>
+        </p:txBody>
+      </p:sp>
+      <p:sp>
+        <p:nvSpPr>
+          <p:cNvPr id="6" name="Content Placeholder 5">
+            <a:extLst>
+              <a:ext uri="{FF2B5EF4-FFF2-40B4-BE49-F238E27FC236}">
+                <a16:creationId xmlns:a16="http://schemas.microsoft.com/office/drawing/2014/main" id="{B100F3AF-4688-9845-865A-516B841DB928}"/>
+              </a:ext>
+            </a:extLst>
+          </p:cNvPr>
+          <p:cNvSpPr>
+            <a:spLocks noGrp="1"/>
+          </p:cNvSpPr>
+          <p:nvPr>
+            <p:ph idx="1"/>
+          </p:nvPr>
+        </p:nvSpPr>
+        <p:spPr>
+          <a:xfrm>
+            <a:off x="504827" y="1460390"/>
+            <a:ext cx="8134348" cy="2702891"/>
+          </a:xfrm>
+        </p:spPr>
+        <p:txBody>
+          <a:bodyPr>
+            <a:normAutofit/>
+          </a:bodyPr>
+          <a:lstStyle/>
+          <a:p>
+            <a:r>
+              <a:rPr lang="en-US" b="1" dirty="0">
+                <a:solidFill>
+                  <a:srgbClr val="0097D9"/>
+                </a:solidFill>
+              </a:rPr>
+              <a:t>Question</a:t>
+            </a:r>
+          </a:p>
+          <a:p>
+            <a:pPr lvl="1"/>
+            <a:r>
+              <a:rPr lang="en-US" dirty="0"/>
+              <a:t>What factors contribute to a better rated nursing home? Identify those factors and you can improve quality of care, increase trust, and ultimately, increase revenue. </a:t>
+            </a:r>
+          </a:p>
+          <a:p>
+            <a:r>
+              <a:rPr lang="en-US" b="1" dirty="0">
+                <a:solidFill>
+                  <a:srgbClr val="0097D9"/>
+                </a:solidFill>
+              </a:rPr>
+              <a:t>Background</a:t>
+            </a:r>
+          </a:p>
+          <a:p>
+            <a:pPr lvl="1"/>
+            <a:r>
+              <a:rPr lang="en-US" dirty="0"/>
+              <a:t>As parents get older, we need to start preparing for what happens as they are no longer able to perform their ADLs (activities of daily living). At that point, we need to start weighing the options between having an at home caregiver to allow them to age in place or finding a nursing home. This can be an overwhelming decision so finding the factors that determine a successful nursing home via visuals will help draw prospects to our business as well as aid in our own decisions.</a:t>
+            </a:r>
+            <a:endParaRPr lang="en-US" b="1" dirty="0">
+              <a:solidFill>
+                <a:srgbClr val="0097D9"/>
+              </a:solidFill>
+            </a:endParaRPr>
           </a:p>
         </p:txBody>
       </p:sp>
@@ -14345,6 +14414,106 @@
               <a:rPr lang="en-US" smtClean="0"/>
               <a:pPr/>
               <a:t>4</a:t>
+            </a:fld>
+            <a:endParaRPr lang="en-US" dirty="0"/>
+          </a:p>
+        </p:txBody>
+      </p:sp>
+    </p:spTree>
+    <p:extLst>
+      <p:ext uri="{BB962C8B-B14F-4D97-AF65-F5344CB8AC3E}">
+        <p14:creationId xmlns:p14="http://schemas.microsoft.com/office/powerpoint/2010/main" val="1310666037"/>
+      </p:ext>
+    </p:extLst>
+  </p:cSld>
+  <p:clrMapOvr>
+    <a:masterClrMapping/>
+  </p:clrMapOvr>
+  <mc:AlternateContent xmlns:mc="http://schemas.openxmlformats.org/markup-compatibility/2006">
+    <mc:Choice xmlns:p14="http://schemas.microsoft.com/office/powerpoint/2010/main" Requires="p14">
+      <p:transition spd="med" p14:dur="700">
+        <p:fade/>
+      </p:transition>
+    </mc:Choice>
+    <mc:Fallback>
+      <p:transition spd="med">
+        <p:fade/>
+      </p:transition>
+    </mc:Fallback>
+  </mc:AlternateContent>
+</p:sld>
+</file>
+
+<file path=ppt/slides/slide5.xml><?xml version="1.0" encoding="utf-8"?>
+<p:sld xmlns:a="http://schemas.openxmlformats.org/drawingml/2006/main" xmlns:r="http://schemas.openxmlformats.org/officeDocument/2006/relationships" xmlns:p="http://schemas.openxmlformats.org/presentationml/2006/main">
+  <p:cSld>
+    <p:spTree>
+      <p:nvGrpSpPr>
+        <p:cNvPr id="1" name=""/>
+        <p:cNvGrpSpPr/>
+        <p:nvPr/>
+      </p:nvGrpSpPr>
+      <p:grpSpPr>
+        <a:xfrm>
+          <a:off x="0" y="0"/>
+          <a:ext cx="0" cy="0"/>
+          <a:chOff x="0" y="0"/>
+          <a:chExt cx="0" cy="0"/>
+        </a:xfrm>
+      </p:grpSpPr>
+      <p:sp>
+        <p:nvSpPr>
+          <p:cNvPr id="5" name="Title 4">
+            <a:extLst>
+              <a:ext uri="{FF2B5EF4-FFF2-40B4-BE49-F238E27FC236}">
+                <a16:creationId xmlns:a16="http://schemas.microsoft.com/office/drawing/2014/main" id="{D0905275-2C3F-C740-B4C6-2E4A2060E93A}"/>
+              </a:ext>
+            </a:extLst>
+          </p:cNvPr>
+          <p:cNvSpPr>
+            <a:spLocks noGrp="1"/>
+          </p:cNvSpPr>
+          <p:nvPr>
+            <p:ph type="title"/>
+          </p:nvPr>
+        </p:nvSpPr>
+        <p:spPr/>
+        <p:txBody>
+          <a:bodyPr/>
+          <a:lstStyle/>
+          <a:p>
+            <a:r>
+              <a:rPr lang="en-US" dirty="0"/>
+              <a:t>Alteryx</a:t>
+            </a:r>
+          </a:p>
+        </p:txBody>
+      </p:sp>
+      <p:sp>
+        <p:nvSpPr>
+          <p:cNvPr id="8" name="Slide Number Placeholder 5">
+            <a:extLst>
+              <a:ext uri="{FF2B5EF4-FFF2-40B4-BE49-F238E27FC236}">
+                <a16:creationId xmlns:a16="http://schemas.microsoft.com/office/drawing/2014/main" id="{25D23053-7992-9F47-90F7-4D13C92AEF9A}"/>
+              </a:ext>
+            </a:extLst>
+          </p:cNvPr>
+          <p:cNvSpPr>
+            <a:spLocks noGrp="1"/>
+          </p:cNvSpPr>
+          <p:nvPr>
+            <p:ph type="sldNum" sz="quarter" idx="12"/>
+          </p:nvPr>
+        </p:nvSpPr>
+        <p:spPr/>
+        <p:txBody>
+          <a:bodyPr/>
+          <a:lstStyle/>
+          <a:p>
+            <a:fld id="{535EF33A-04D8-4107-96E5-33B70AE88DFF}" type="slidenum">
+              <a:rPr lang="en-US" smtClean="0"/>
+              <a:pPr/>
+              <a:t>5</a:t>
             </a:fld>
             <a:endParaRPr lang="en-US" dirty="0"/>
           </a:p>
@@ -14405,7 +14574,7 @@
 </p:sld>
 </file>
 
-<file path=ppt/slides/slide5.xml><?xml version="1.0" encoding="utf-8"?>
+<file path=ppt/slides/slide6.xml><?xml version="1.0" encoding="utf-8"?>
 <p:sld xmlns:a="http://schemas.openxmlformats.org/drawingml/2006/main" xmlns:r="http://schemas.openxmlformats.org/officeDocument/2006/relationships" xmlns:p="http://schemas.openxmlformats.org/presentationml/2006/main">
   <p:cSld>
     <p:spTree>
@@ -14474,7 +14643,7 @@
             <a:fld id="{535EF33A-04D8-4107-96E5-33B70AE88DFF}" type="slidenum">
               <a:rPr lang="en-US" smtClean="0"/>
               <a:pPr/>
-              <a:t>5</a:t>
+              <a:t>6</a:t>
             </a:fld>
             <a:endParaRPr lang="en-US" dirty="0"/>
           </a:p>
@@ -14495,13 +14664,13 @@
           <p:nvPr>
             <p:extLst>
               <p:ext uri="{D42A27DB-BD31-4B8C-83A1-F6EECF244321}">
-                <p14:modId xmlns:p14="http://schemas.microsoft.com/office/powerpoint/2010/main" val="831646069"/>
+                <p14:modId xmlns:p14="http://schemas.microsoft.com/office/powerpoint/2010/main" val="1200131654"/>
               </p:ext>
             </p:extLst>
           </p:nvPr>
         </p:nvGraphicFramePr>
         <p:xfrm>
-          <a:off x="1389246" y="1434899"/>
+          <a:off x="1389246" y="1338647"/>
           <a:ext cx="6096000" cy="2898651"/>
         </p:xfrm>
         <a:graphic>
@@ -14786,144 +14955,52 @@
           </a:graphicData>
         </a:graphic>
       </p:graphicFrame>
+      <p:sp>
+        <p:nvSpPr>
+          <p:cNvPr id="3" name="TextBox 2">
+            <a:extLst>
+              <a:ext uri="{FF2B5EF4-FFF2-40B4-BE49-F238E27FC236}">
+                <a16:creationId xmlns:a16="http://schemas.microsoft.com/office/drawing/2014/main" id="{E4124544-8060-4725-AB93-58181343D179}"/>
+              </a:ext>
+            </a:extLst>
+          </p:cNvPr>
+          <p:cNvSpPr txBox="1"/>
+          <p:nvPr/>
+        </p:nvSpPr>
+        <p:spPr>
+          <a:xfrm>
+            <a:off x="3297363" y="4341266"/>
+            <a:ext cx="5661935" cy="307777"/>
+          </a:xfrm>
+          <a:prstGeom prst="rect">
+            <a:avLst/>
+          </a:prstGeom>
+          <a:noFill/>
+        </p:spPr>
+        <p:txBody>
+          <a:bodyPr wrap="none" rtlCol="0">
+            <a:spAutoFit/>
+          </a:bodyPr>
+          <a:lstStyle/>
+          <a:p>
+            <a:r>
+              <a:rPr lang="en-US" dirty="0"/>
+              <a:t>Tableau vs D3.js – </a:t>
+            </a:r>
+            <a:r>
+              <a:rPr lang="en-US" sz="1400" dirty="0">
+                <a:hlinkClick r:id="rId2"/>
+              </a:rPr>
+              <a:t>https://www.arkatechture.com/blog/tableau-vs.-d3</a:t>
+            </a:r>
+            <a:endParaRPr lang="en-US" dirty="0"/>
+          </a:p>
+        </p:txBody>
+      </p:sp>
     </p:spTree>
     <p:extLst>
       <p:ext uri="{BB962C8B-B14F-4D97-AF65-F5344CB8AC3E}">
         <p14:creationId xmlns:p14="http://schemas.microsoft.com/office/powerpoint/2010/main" val="155349167"/>
-      </p:ext>
-    </p:extLst>
-  </p:cSld>
-  <p:clrMapOvr>
-    <a:masterClrMapping/>
-  </p:clrMapOvr>
-  <mc:AlternateContent xmlns:mc="http://schemas.openxmlformats.org/markup-compatibility/2006" xmlns:p14="http://schemas.microsoft.com/office/powerpoint/2010/main">
-    <mc:Choice Requires="p14">
-      <p:transition spd="med" p14:dur="700">
-        <p:fade/>
-      </p:transition>
-    </mc:Choice>
-    <mc:Fallback xmlns="">
-      <p:transition spd="med">
-        <p:fade/>
-      </p:transition>
-    </mc:Fallback>
-  </mc:AlternateContent>
-</p:sld>
-</file>
-
-<file path=ppt/slides/slide6.xml><?xml version="1.0" encoding="utf-8"?>
-<p:sld xmlns:a="http://schemas.openxmlformats.org/drawingml/2006/main" xmlns:r="http://schemas.openxmlformats.org/officeDocument/2006/relationships" xmlns:p="http://schemas.openxmlformats.org/presentationml/2006/main">
-  <p:cSld>
-    <p:spTree>
-      <p:nvGrpSpPr>
-        <p:cNvPr id="1" name=""/>
-        <p:cNvGrpSpPr/>
-        <p:nvPr/>
-      </p:nvGrpSpPr>
-      <p:grpSpPr>
-        <a:xfrm>
-          <a:off x="0" y="0"/>
-          <a:ext cx="0" cy="0"/>
-          <a:chOff x="0" y="0"/>
-          <a:chExt cx="0" cy="0"/>
-        </a:xfrm>
-      </p:grpSpPr>
-      <p:sp>
-        <p:nvSpPr>
-          <p:cNvPr id="5" name="Title 4">
-            <a:extLst>
-              <a:ext uri="{FF2B5EF4-FFF2-40B4-BE49-F238E27FC236}">
-                <a16:creationId xmlns:a16="http://schemas.microsoft.com/office/drawing/2014/main" id="{D0905275-2C3F-C740-B4C6-2E4A2060E93A}"/>
-              </a:ext>
-            </a:extLst>
-          </p:cNvPr>
-          <p:cNvSpPr>
-            <a:spLocks noGrp="1"/>
-          </p:cNvSpPr>
-          <p:nvPr>
-            <p:ph type="title"/>
-          </p:nvPr>
-        </p:nvSpPr>
-        <p:spPr/>
-        <p:txBody>
-          <a:bodyPr/>
-          <a:lstStyle/>
-          <a:p>
-            <a:r>
-              <a:rPr lang="en-US" dirty="0" err="1"/>
-              <a:t>TractorTek</a:t>
-            </a:r>
-            <a:r>
-              <a:rPr lang="en-US" dirty="0"/>
-              <a:t> Database Web App</a:t>
-            </a:r>
-          </a:p>
-        </p:txBody>
-      </p:sp>
-      <p:sp>
-        <p:nvSpPr>
-          <p:cNvPr id="8" name="Slide Number Placeholder 5">
-            <a:extLst>
-              <a:ext uri="{FF2B5EF4-FFF2-40B4-BE49-F238E27FC236}">
-                <a16:creationId xmlns:a16="http://schemas.microsoft.com/office/drawing/2014/main" id="{25D23053-7992-9F47-90F7-4D13C92AEF9A}"/>
-              </a:ext>
-            </a:extLst>
-          </p:cNvPr>
-          <p:cNvSpPr>
-            <a:spLocks noGrp="1"/>
-          </p:cNvSpPr>
-          <p:nvPr>
-            <p:ph type="sldNum" sz="quarter" idx="12"/>
-          </p:nvPr>
-        </p:nvSpPr>
-        <p:spPr/>
-        <p:txBody>
-          <a:bodyPr/>
-          <a:lstStyle/>
-          <a:p>
-            <a:fld id="{535EF33A-04D8-4107-96E5-33B70AE88DFF}" type="slidenum">
-              <a:rPr lang="en-US" smtClean="0"/>
-              <a:pPr/>
-              <a:t>6</a:t>
-            </a:fld>
-            <a:endParaRPr lang="en-US" dirty="0"/>
-          </a:p>
-        </p:txBody>
-      </p:sp>
-      <p:pic>
-        <p:nvPicPr>
-          <p:cNvPr id="3" name="Picture 2" descr="Text&#10;&#10;Description automatically generated">
-            <a:extLst>
-              <a:ext uri="{FF2B5EF4-FFF2-40B4-BE49-F238E27FC236}">
-                <a16:creationId xmlns:a16="http://schemas.microsoft.com/office/drawing/2014/main" id="{47EB824D-BFC5-4D5C-A33F-F3032572806B}"/>
-              </a:ext>
-            </a:extLst>
-          </p:cNvPr>
-          <p:cNvPicPr>
-            <a:picLocks noChangeAspect="1"/>
-          </p:cNvPicPr>
-          <p:nvPr/>
-        </p:nvPicPr>
-        <p:blipFill>
-          <a:blip r:embed="rId2"/>
-          <a:stretch>
-            <a:fillRect/>
-          </a:stretch>
-        </p:blipFill>
-        <p:spPr>
-          <a:xfrm>
-            <a:off x="1312557" y="1284623"/>
-            <a:ext cx="6518883" cy="3486739"/>
-          </a:xfrm>
-          <a:prstGeom prst="rect">
-            <a:avLst/>
-          </a:prstGeom>
-        </p:spPr>
-      </p:pic>
-    </p:spTree>
-    <p:extLst>
-      <p:ext uri="{BB962C8B-B14F-4D97-AF65-F5344CB8AC3E}">
-        <p14:creationId xmlns:p14="http://schemas.microsoft.com/office/powerpoint/2010/main" val="889406002"/>
       </p:ext>
     </p:extLst>
   </p:cSld>
@@ -15121,6 +15198,222 @@
 </file>
 
 <file path=ppt/slides/slide8.xml><?xml version="1.0" encoding="utf-8"?>
+<p:sld xmlns:a="http://schemas.openxmlformats.org/drawingml/2006/main" xmlns:r="http://schemas.openxmlformats.org/officeDocument/2006/relationships" xmlns:p="http://schemas.openxmlformats.org/presentationml/2006/main">
+  <p:cSld>
+    <p:spTree>
+      <p:nvGrpSpPr>
+        <p:cNvPr id="1" name=""/>
+        <p:cNvGrpSpPr/>
+        <p:nvPr/>
+      </p:nvGrpSpPr>
+      <p:grpSpPr>
+        <a:xfrm>
+          <a:off x="0" y="0"/>
+          <a:ext cx="0" cy="0"/>
+          <a:chOff x="0" y="0"/>
+          <a:chExt cx="0" cy="0"/>
+        </a:xfrm>
+      </p:grpSpPr>
+      <p:sp>
+        <p:nvSpPr>
+          <p:cNvPr id="5" name="Title 4">
+            <a:extLst>
+              <a:ext uri="{FF2B5EF4-FFF2-40B4-BE49-F238E27FC236}">
+                <a16:creationId xmlns:a16="http://schemas.microsoft.com/office/drawing/2014/main" id="{D0905275-2C3F-C740-B4C6-2E4A2060E93A}"/>
+              </a:ext>
+            </a:extLst>
+          </p:cNvPr>
+          <p:cNvSpPr>
+            <a:spLocks noGrp="1"/>
+          </p:cNvSpPr>
+          <p:nvPr>
+            <p:ph type="title"/>
+          </p:nvPr>
+        </p:nvSpPr>
+        <p:spPr/>
+        <p:txBody>
+          <a:bodyPr/>
+          <a:lstStyle/>
+          <a:p>
+            <a:r>
+              <a:rPr lang="en-US" dirty="0"/>
+              <a:t>Resources</a:t>
+            </a:r>
+          </a:p>
+        </p:txBody>
+      </p:sp>
+      <p:sp>
+        <p:nvSpPr>
+          <p:cNvPr id="6" name="Content Placeholder 5">
+            <a:extLst>
+              <a:ext uri="{FF2B5EF4-FFF2-40B4-BE49-F238E27FC236}">
+                <a16:creationId xmlns:a16="http://schemas.microsoft.com/office/drawing/2014/main" id="{B100F3AF-4688-9845-865A-516B841DB928}"/>
+              </a:ext>
+            </a:extLst>
+          </p:cNvPr>
+          <p:cNvSpPr>
+            <a:spLocks noGrp="1"/>
+          </p:cNvSpPr>
+          <p:nvPr>
+            <p:ph idx="1"/>
+          </p:nvPr>
+        </p:nvSpPr>
+        <p:spPr>
+          <a:xfrm>
+            <a:off x="504827" y="1352551"/>
+            <a:ext cx="8134348" cy="3232150"/>
+          </a:xfrm>
+        </p:spPr>
+        <p:txBody>
+          <a:bodyPr>
+            <a:normAutofit/>
+          </a:bodyPr>
+          <a:lstStyle/>
+          <a:p>
+            <a:r>
+              <a:rPr lang="en-US" b="1" dirty="0">
+                <a:solidFill>
+                  <a:srgbClr val="0097D9"/>
+                </a:solidFill>
+              </a:rPr>
+              <a:t>US State Sizes: </a:t>
+            </a:r>
+            <a:r>
+              <a:rPr lang="en-US" dirty="0">
+                <a:hlinkClick r:id="rId2"/>
+              </a:rPr>
+              <a:t>https://github.com/jakevdp/data-USstates/blob/master/state-areas.csv</a:t>
+            </a:r>
+            <a:endParaRPr lang="en-US" dirty="0"/>
+          </a:p>
+          <a:p>
+            <a:r>
+              <a:rPr lang="en-US" b="1" dirty="0">
+                <a:solidFill>
+                  <a:srgbClr val="0097D9"/>
+                </a:solidFill>
+              </a:rPr>
+              <a:t>Nursing Home Stats: </a:t>
+            </a:r>
+            <a:r>
+              <a:rPr lang="en-US" dirty="0">
+                <a:hlinkClick r:id="rId3"/>
+              </a:rPr>
+              <a:t>https://data.cms.gov/provider-data/search?theme=Nursing%20homes%20including%20rehab%20services</a:t>
+            </a:r>
+            <a:endParaRPr lang="en-US" dirty="0"/>
+          </a:p>
+          <a:p>
+            <a:r>
+              <a:rPr lang="en-US" b="1" dirty="0">
+                <a:solidFill>
+                  <a:srgbClr val="0097D9"/>
+                </a:solidFill>
+              </a:rPr>
+              <a:t>US Population: </a:t>
+            </a:r>
+            <a:r>
+              <a:rPr lang="en-US" dirty="0">
+                <a:hlinkClick r:id="rId4"/>
+              </a:rPr>
+              <a:t>https://www.census.gov/data/tables/time-series/demo/popest/2010s-state-total.html</a:t>
+            </a:r>
+            <a:endParaRPr lang="en-US" dirty="0"/>
+          </a:p>
+          <a:p>
+            <a:r>
+              <a:rPr lang="en-US" b="1" dirty="0">
+                <a:solidFill>
+                  <a:srgbClr val="0097D9"/>
+                </a:solidFill>
+              </a:rPr>
+              <a:t>Nursing Home Rating Terms and explanations: </a:t>
+            </a:r>
+          </a:p>
+          <a:p>
+            <a:pPr lvl="1"/>
+            <a:r>
+              <a:rPr lang="en-US" dirty="0">
+                <a:hlinkClick r:id="rId5"/>
+              </a:rPr>
+              <a:t>https://www.cms.gov/Medicare/Provider-Enrollment-and-Certification/CertificationandComplianc/FSQRS#:~:text=Quality%20Measures%20(QMs)%20%E2%80%93%20The,residents'%20physical%20and%20clinical%20needs</a:t>
+            </a:r>
+            <a:r>
+              <a:rPr lang="en-US" dirty="0"/>
+              <a:t>.</a:t>
+            </a:r>
+          </a:p>
+          <a:p>
+            <a:pPr lvl="1"/>
+            <a:r>
+              <a:rPr lang="en-US" dirty="0">
+                <a:solidFill>
+                  <a:srgbClr val="0097D9"/>
+                </a:solidFill>
+                <a:hlinkClick r:id="rId6"/>
+              </a:rPr>
+              <a:t>https://health.mo.gov/safety/nursinghomesinspected/index.php</a:t>
+            </a:r>
+            <a:endParaRPr lang="en-US" dirty="0"/>
+          </a:p>
+        </p:txBody>
+      </p:sp>
+      <p:sp>
+        <p:nvSpPr>
+          <p:cNvPr id="8" name="Slide Number Placeholder 5">
+            <a:extLst>
+              <a:ext uri="{FF2B5EF4-FFF2-40B4-BE49-F238E27FC236}">
+                <a16:creationId xmlns:a16="http://schemas.microsoft.com/office/drawing/2014/main" id="{25D23053-7992-9F47-90F7-4D13C92AEF9A}"/>
+              </a:ext>
+            </a:extLst>
+          </p:cNvPr>
+          <p:cNvSpPr>
+            <a:spLocks noGrp="1"/>
+          </p:cNvSpPr>
+          <p:nvPr>
+            <p:ph type="sldNum" sz="quarter" idx="12"/>
+          </p:nvPr>
+        </p:nvSpPr>
+        <p:spPr/>
+        <p:txBody>
+          <a:bodyPr/>
+          <a:lstStyle/>
+          <a:p>
+            <a:fld id="{535EF33A-04D8-4107-96E5-33B70AE88DFF}" type="slidenum">
+              <a:rPr lang="en-US" smtClean="0"/>
+              <a:pPr/>
+              <a:t>8</a:t>
+            </a:fld>
+            <a:endParaRPr lang="en-US" dirty="0"/>
+          </a:p>
+        </p:txBody>
+      </p:sp>
+    </p:spTree>
+    <p:extLst>
+      <p:ext uri="{BB962C8B-B14F-4D97-AF65-F5344CB8AC3E}">
+        <p14:creationId xmlns:p14="http://schemas.microsoft.com/office/powerpoint/2010/main" val="1606140614"/>
+      </p:ext>
+    </p:extLst>
+  </p:cSld>
+  <p:clrMapOvr>
+    <a:masterClrMapping/>
+  </p:clrMapOvr>
+  <mc:AlternateContent xmlns:mc="http://schemas.openxmlformats.org/markup-compatibility/2006">
+    <mc:Choice xmlns:p14="http://schemas.microsoft.com/office/powerpoint/2010/main" Requires="p14">
+      <p:transition spd="med" p14:dur="700">
+        <p:fade/>
+      </p:transition>
+    </mc:Choice>
+    <mc:Fallback>
+      <p:transition spd="med">
+        <p:fade/>
+      </p:transition>
+    </mc:Fallback>
+  </mc:AlternateContent>
+</p:sld>
+</file>
+
+<file path=ppt/slides/slide9.xml><?xml version="1.0" encoding="utf-8"?>
 <p:sld xmlns:a="http://schemas.openxmlformats.org/drawingml/2006/main" xmlns:r="http://schemas.openxmlformats.org/officeDocument/2006/relationships" xmlns:p="http://schemas.openxmlformats.org/presentationml/2006/main">
   <p:cSld>
     <p:spTree>
@@ -16052,15 +16345,6 @@
 </file>
 
 <file path=customXml/item2.xml><?xml version="1.0" encoding="utf-8"?>
-<?mso-contentType ?>
-<FormTemplates xmlns="http://schemas.microsoft.com/sharepoint/v3/contenttype/forms">
-  <Display>DocumentLibraryForm</Display>
-  <Edit>DocumentLibraryForm</Edit>
-  <New>DocumentLibraryForm</New>
-</FormTemplates>
-</file>
-
-<file path=customXml/item3.xml><?xml version="1.0" encoding="utf-8"?>
 <ct:contentTypeSchema xmlns:ct="http://schemas.microsoft.com/office/2006/metadata/contentType" xmlns:ma="http://schemas.microsoft.com/office/2006/metadata/properties/metaAttributes" ct:_="" ma:_="" ma:contentTypeName="Document" ma:contentTypeID="0x010100FEF7458C51E57141848015B90E19E3FF" ma:contentTypeVersion="7" ma:contentTypeDescription="Create a new document." ma:contentTypeScope="" ma:versionID="83f648d576e601b92f7142a7f572c300">
   <xsd:schema xmlns:xsd="http://www.w3.org/2001/XMLSchema" xmlns:xs="http://www.w3.org/2001/XMLSchema" xmlns:p="http://schemas.microsoft.com/office/2006/metadata/properties" xmlns:ns2="d2a9f884-c2eb-4182-8d97-b2c1069a1e77" xmlns:ns3="ad1dcd44-2c79-421e-996d-e07b6b6a06b7" targetNamespace="http://schemas.microsoft.com/office/2006/metadata/properties" ma:root="true" ma:fieldsID="0d22376f87372475b46127375c8e888e" ns2:_="" ns3:_="">
     <xsd:import namespace="d2a9f884-c2eb-4182-8d97-b2c1069a1e77"/>
@@ -16245,6 +16529,15 @@
 </ct:contentTypeSchema>
 </file>
 
+<file path=customXml/item3.xml><?xml version="1.0" encoding="utf-8"?>
+<?mso-contentType ?>
+<FormTemplates xmlns="http://schemas.microsoft.com/sharepoint/v3/contenttype/forms">
+  <Display>DocumentLibraryForm</Display>
+  <Edit>DocumentLibraryForm</Edit>
+  <New>DocumentLibraryForm</New>
+</FormTemplates>
+</file>
+
 <file path=customXml/itemProps1.xml><?xml version="1.0" encoding="utf-8"?>
 <ds:datastoreItem xmlns:ds="http://schemas.openxmlformats.org/officeDocument/2006/customXml" ds:itemID="{E3F0252B-B6E9-4221-B01E-0247E154DC26}">
   <ds:schemaRefs>
@@ -16263,14 +16556,6 @@
 </file>
 
 <file path=customXml/itemProps2.xml><?xml version="1.0" encoding="utf-8"?>
-<ds:datastoreItem xmlns:ds="http://schemas.openxmlformats.org/officeDocument/2006/customXml" ds:itemID="{F11117D9-2152-408D-8EA9-A138D8484626}">
-  <ds:schemaRefs>
-    <ds:schemaRef ds:uri="http://schemas.microsoft.com/sharepoint/v3/contenttype/forms"/>
-  </ds:schemaRefs>
-</ds:datastoreItem>
-</file>
-
-<file path=customXml/itemProps3.xml><?xml version="1.0" encoding="utf-8"?>
 <ds:datastoreItem xmlns:ds="http://schemas.openxmlformats.org/officeDocument/2006/customXml" ds:itemID="{6062DE58-109F-4D2D-8F00-D49A02B03B4B}">
   <ds:schemaRefs>
     <ds:schemaRef ds:uri="http://schemas.microsoft.com/office/2006/metadata/contentType"/>
@@ -16287,4 +16572,12 @@
     <ds:schemaRef ds:uri="http://schemas.microsoft.com/internal/obd"/>
   </ds:schemaRefs>
 </ds:datastoreItem>
+</file>
+
+<file path=customXml/itemProps3.xml><?xml version="1.0" encoding="utf-8"?>
+<ds:datastoreItem xmlns:ds="http://schemas.openxmlformats.org/officeDocument/2006/customXml" ds:itemID="{F11117D9-2152-408D-8EA9-A138D8484626}">
+  <ds:schemaRefs>
+    <ds:schemaRef ds:uri="http://schemas.microsoft.com/sharepoint/v3/contenttype/forms"/>
+  </ds:schemaRefs>
+</ds:datastoreItem>
 </file>
</xml_diff>

<commit_message>
meets damiem's tentative approval
</commit_message>
<xml_diff>
--- a/InformatiTekRFP.pptx
+++ b/InformatiTekRFP.pptx
@@ -5,21 +5,20 @@
     <p:sldMasterId id="2147483769" r:id="rId4"/>
   </p:sldMasterIdLst>
   <p:notesMasterIdLst>
-    <p:notesMasterId r:id="rId14"/>
+    <p:notesMasterId r:id="rId13"/>
   </p:notesMasterIdLst>
   <p:handoutMasterIdLst>
-    <p:handoutMasterId r:id="rId15"/>
+    <p:handoutMasterId r:id="rId14"/>
   </p:handoutMasterIdLst>
   <p:sldIdLst>
     <p:sldId id="330" r:id="rId5"/>
     <p:sldId id="344" r:id="rId6"/>
     <p:sldId id="354" r:id="rId7"/>
     <p:sldId id="361" r:id="rId8"/>
-    <p:sldId id="355" r:id="rId9"/>
-    <p:sldId id="356" r:id="rId10"/>
-    <p:sldId id="360" r:id="rId11"/>
-    <p:sldId id="362" r:id="rId12"/>
-    <p:sldId id="332" r:id="rId13"/>
+    <p:sldId id="362" r:id="rId9"/>
+    <p:sldId id="355" r:id="rId10"/>
+    <p:sldId id="356" r:id="rId11"/>
+    <p:sldId id="332" r:id="rId12"/>
   </p:sldIdLst>
   <p:sldSz cx="9144000" cy="5143500" type="screen16x9"/>
   <p:notesSz cx="6950075" cy="9236075"/>
@@ -826,10 +825,7 @@
           <a:bodyPr/>
           <a:lstStyle/>
           <a:p>
-            <a:r>
-              <a:rPr lang="en-US" dirty="0"/>
-              <a:t>Alteryx vs python for data clean up?</a:t>
-            </a:r>
+            <a:endParaRPr lang="en-US" dirty="0"/>
           </a:p>
         </p:txBody>
       </p:sp>
@@ -851,6 +847,93 @@
             <a:fld id="{2455D1DE-A7B1-4046-BEEF-D8F8EFF4F403}" type="slidenum">
               <a:rPr lang="en-US" smtClean="0"/>
               <a:t>5</a:t>
+            </a:fld>
+            <a:endParaRPr lang="en-US" dirty="0"/>
+          </a:p>
+        </p:txBody>
+      </p:sp>
+    </p:spTree>
+    <p:extLst>
+      <p:ext uri="{BB962C8B-B14F-4D97-AF65-F5344CB8AC3E}">
+        <p14:creationId xmlns:p14="http://schemas.microsoft.com/office/powerpoint/2010/main" val="2950612021"/>
+      </p:ext>
+    </p:extLst>
+  </p:cSld>
+  <p:clrMapOvr>
+    <a:masterClrMapping/>
+  </p:clrMapOvr>
+</p:notes>
+</file>
+
+<file path=ppt/notesSlides/notesSlide3.xml><?xml version="1.0" encoding="utf-8"?>
+<p:notes xmlns:a="http://schemas.openxmlformats.org/drawingml/2006/main" xmlns:r="http://schemas.openxmlformats.org/officeDocument/2006/relationships" xmlns:p="http://schemas.openxmlformats.org/presentationml/2006/main">
+  <p:cSld>
+    <p:spTree>
+      <p:nvGrpSpPr>
+        <p:cNvPr id="1" name=""/>
+        <p:cNvGrpSpPr/>
+        <p:nvPr/>
+      </p:nvGrpSpPr>
+      <p:grpSpPr>
+        <a:xfrm>
+          <a:off x="0" y="0"/>
+          <a:ext cx="0" cy="0"/>
+          <a:chOff x="0" y="0"/>
+          <a:chExt cx="0" cy="0"/>
+        </a:xfrm>
+      </p:grpSpPr>
+      <p:sp>
+        <p:nvSpPr>
+          <p:cNvPr id="2" name="Slide Image Placeholder 1"/>
+          <p:cNvSpPr>
+            <a:spLocks noGrp="1" noRot="1" noChangeAspect="1"/>
+          </p:cNvSpPr>
+          <p:nvPr>
+            <p:ph type="sldImg"/>
+          </p:nvPr>
+        </p:nvSpPr>
+        <p:spPr/>
+      </p:sp>
+      <p:sp>
+        <p:nvSpPr>
+          <p:cNvPr id="3" name="Notes Placeholder 2"/>
+          <p:cNvSpPr>
+            <a:spLocks noGrp="1"/>
+          </p:cNvSpPr>
+          <p:nvPr>
+            <p:ph type="body" idx="1"/>
+          </p:nvPr>
+        </p:nvSpPr>
+        <p:spPr/>
+        <p:txBody>
+          <a:bodyPr/>
+          <a:lstStyle/>
+          <a:p>
+            <a:r>
+              <a:rPr lang="en-US" dirty="0"/>
+              <a:t>Alteryx vs python for data clean up?</a:t>
+            </a:r>
+          </a:p>
+        </p:txBody>
+      </p:sp>
+      <p:sp>
+        <p:nvSpPr>
+          <p:cNvPr id="4" name="Slide Number Placeholder 3"/>
+          <p:cNvSpPr>
+            <a:spLocks noGrp="1"/>
+          </p:cNvSpPr>
+          <p:nvPr>
+            <p:ph type="sldNum" sz="quarter" idx="5"/>
+          </p:nvPr>
+        </p:nvSpPr>
+        <p:spPr/>
+        <p:txBody>
+          <a:bodyPr/>
+          <a:lstStyle/>
+          <a:p>
+            <a:fld id="{2455D1DE-A7B1-4046-BEEF-D8F8EFF4F403}" type="slidenum">
+              <a:rPr lang="en-US" smtClean="0"/>
+              <a:t>6</a:t>
             </a:fld>
             <a:endParaRPr lang="en-US" dirty="0"/>
           </a:p>
@@ -14429,13 +14512,13 @@
   <p:clrMapOvr>
     <a:masterClrMapping/>
   </p:clrMapOvr>
-  <mc:AlternateContent xmlns:mc="http://schemas.openxmlformats.org/markup-compatibility/2006">
-    <mc:Choice xmlns:p14="http://schemas.microsoft.com/office/powerpoint/2010/main" Requires="p14">
+  <mc:AlternateContent xmlns:mc="http://schemas.openxmlformats.org/markup-compatibility/2006" xmlns:p14="http://schemas.microsoft.com/office/powerpoint/2010/main">
+    <mc:Choice Requires="p14">
       <p:transition spd="med" p14:dur="700">
         <p:fade/>
       </p:transition>
     </mc:Choice>
-    <mc:Fallback>
+    <mc:Fallback xmlns="">
       <p:transition spd="med">
         <p:fade/>
       </p:transition>
@@ -14484,8 +14567,108 @@
           <a:p>
             <a:r>
               <a:rPr lang="en-US" dirty="0"/>
-              <a:t>Alteryx</a:t>
-            </a:r>
+              <a:t>Resources</a:t>
+            </a:r>
+          </a:p>
+        </p:txBody>
+      </p:sp>
+      <p:sp>
+        <p:nvSpPr>
+          <p:cNvPr id="6" name="Content Placeholder 5">
+            <a:extLst>
+              <a:ext uri="{FF2B5EF4-FFF2-40B4-BE49-F238E27FC236}">
+                <a16:creationId xmlns:a16="http://schemas.microsoft.com/office/drawing/2014/main" id="{B100F3AF-4688-9845-865A-516B841DB928}"/>
+              </a:ext>
+            </a:extLst>
+          </p:cNvPr>
+          <p:cNvSpPr>
+            <a:spLocks noGrp="1"/>
+          </p:cNvSpPr>
+          <p:nvPr>
+            <p:ph idx="1"/>
+          </p:nvPr>
+        </p:nvSpPr>
+        <p:spPr>
+          <a:xfrm>
+            <a:off x="504827" y="1352551"/>
+            <a:ext cx="8134348" cy="3232150"/>
+          </a:xfrm>
+        </p:spPr>
+        <p:txBody>
+          <a:bodyPr>
+            <a:normAutofit/>
+          </a:bodyPr>
+          <a:lstStyle/>
+          <a:p>
+            <a:r>
+              <a:rPr lang="en-US" b="1" dirty="0"/>
+              <a:t>Nursing Home Stats: </a:t>
+            </a:r>
+            <a:r>
+              <a:rPr lang="en-US" dirty="0">
+                <a:hlinkClick r:id="rId3"/>
+              </a:rPr>
+              <a:t>https://data.cms.gov/provider-data/search?theme=Nursing%20homes%20including%20rehab%20services</a:t>
+            </a:r>
+            <a:endParaRPr lang="en-US" dirty="0"/>
+          </a:p>
+          <a:p>
+            <a:r>
+              <a:rPr lang="en-US" b="1" dirty="0"/>
+              <a:t>US State Sizes (US census): </a:t>
+            </a:r>
+            <a:r>
+              <a:rPr lang="en-US" dirty="0">
+                <a:hlinkClick r:id="rId4"/>
+              </a:rPr>
+              <a:t>https://github.com/jakevdp/data-USstates/blob/master/state-areas.csv</a:t>
+            </a:r>
+            <a:endParaRPr lang="en-US" dirty="0"/>
+          </a:p>
+          <a:p>
+            <a:r>
+              <a:rPr lang="en-US" b="1" dirty="0"/>
+              <a:t>US Population: </a:t>
+            </a:r>
+            <a:r>
+              <a:rPr lang="en-US" dirty="0">
+                <a:hlinkClick r:id="rId5"/>
+              </a:rPr>
+              <a:t>https://www.census.gov/data/tables/time-series/demo/popest/2010s-state-total.html</a:t>
+            </a:r>
+            <a:endParaRPr lang="en-US" dirty="0"/>
+          </a:p>
+          <a:p>
+            <a:r>
+              <a:rPr lang="en-US" b="1" dirty="0"/>
+              <a:t>Nursing Home Rating Terms and explanations: </a:t>
+            </a:r>
+          </a:p>
+          <a:p>
+            <a:pPr lvl="1"/>
+            <a:r>
+              <a:rPr lang="en-US" dirty="0">
+                <a:hlinkClick r:id="rId6"/>
+              </a:rPr>
+              <a:t>https://www.cms.gov/Medicare/Provider-Enrollment-and-Certification/CertificationandComplianc/FSQRS#:~:text=Quality%20Measures%20(QMs)%20%E2%80%93%20The,residents'%20physical%20and%20clinical%20needs</a:t>
+            </a:r>
+            <a:r>
+              <a:rPr lang="en-US" dirty="0"/>
+              <a:t>.</a:t>
+            </a:r>
+          </a:p>
+          <a:p>
+            <a:pPr lvl="1"/>
+            <a:r>
+              <a:rPr lang="en-US" dirty="0">
+                <a:solidFill>
+                  <a:srgbClr val="0097D9"/>
+                </a:solidFill>
+                <a:hlinkClick r:id="rId7"/>
+              </a:rPr>
+              <a:t>https://health.mo.gov/safety/nursinghomesinspected/index.php</a:t>
+            </a:r>
+            <a:endParaRPr lang="en-US" dirty="0"/>
           </a:p>
         </p:txBody>
       </p:sp>
@@ -14519,40 +14702,10 @@
           </a:p>
         </p:txBody>
       </p:sp>
-      <p:pic>
-        <p:nvPicPr>
-          <p:cNvPr id="3" name="Picture 2">
-            <a:extLst>
-              <a:ext uri="{FF2B5EF4-FFF2-40B4-BE49-F238E27FC236}">
-                <a16:creationId xmlns:a16="http://schemas.microsoft.com/office/drawing/2014/main" id="{1536C6F4-22FB-430D-B746-0F4AD9425DA6}"/>
-              </a:ext>
-            </a:extLst>
-          </p:cNvPr>
-          <p:cNvPicPr>
-            <a:picLocks noChangeAspect="1"/>
-          </p:cNvPicPr>
-          <p:nvPr/>
-        </p:nvPicPr>
-        <p:blipFill>
-          <a:blip r:embed="rId3"/>
-          <a:stretch>
-            <a:fillRect/>
-          </a:stretch>
-        </p:blipFill>
-        <p:spPr>
-          <a:xfrm>
-            <a:off x="2068528" y="1234679"/>
-            <a:ext cx="4726907" cy="3190016"/>
-          </a:xfrm>
-          <a:prstGeom prst="rect">
-            <a:avLst/>
-          </a:prstGeom>
-        </p:spPr>
-      </p:pic>
     </p:spTree>
     <p:extLst>
       <p:ext uri="{BB962C8B-B14F-4D97-AF65-F5344CB8AC3E}">
-        <p14:creationId xmlns:p14="http://schemas.microsoft.com/office/powerpoint/2010/main" val="3797218038"/>
+        <p14:creationId xmlns:p14="http://schemas.microsoft.com/office/powerpoint/2010/main" val="1606140614"/>
       </p:ext>
     </p:extLst>
   </p:cSld>
@@ -14614,7 +14767,7 @@
           <a:p>
             <a:r>
               <a:rPr lang="en-US" dirty="0"/>
-              <a:t>Tableau vs D3.js</a:t>
+              <a:t>Alteryx</a:t>
             </a:r>
           </a:p>
         </p:txBody>
@@ -14644,6 +14797,136 @@
               <a:rPr lang="en-US" smtClean="0"/>
               <a:pPr/>
               <a:t>6</a:t>
+            </a:fld>
+            <a:endParaRPr lang="en-US" dirty="0"/>
+          </a:p>
+        </p:txBody>
+      </p:sp>
+      <p:pic>
+        <p:nvPicPr>
+          <p:cNvPr id="4" name="Picture 3">
+            <a:extLst>
+              <a:ext uri="{FF2B5EF4-FFF2-40B4-BE49-F238E27FC236}">
+                <a16:creationId xmlns:a16="http://schemas.microsoft.com/office/drawing/2014/main" id="{F907DE88-7BC2-4B17-96EB-D5B52C79006A}"/>
+              </a:ext>
+            </a:extLst>
+          </p:cNvPr>
+          <p:cNvPicPr>
+            <a:picLocks noChangeAspect="1"/>
+          </p:cNvPicPr>
+          <p:nvPr/>
+        </p:nvPicPr>
+        <p:blipFill>
+          <a:blip r:embed="rId3"/>
+          <a:stretch>
+            <a:fillRect/>
+          </a:stretch>
+        </p:blipFill>
+        <p:spPr>
+          <a:xfrm>
+            <a:off x="862011" y="1660358"/>
+            <a:ext cx="7419975" cy="2400300"/>
+          </a:xfrm>
+          <a:prstGeom prst="rect">
+            <a:avLst/>
+          </a:prstGeom>
+        </p:spPr>
+      </p:pic>
+    </p:spTree>
+    <p:extLst>
+      <p:ext uri="{BB962C8B-B14F-4D97-AF65-F5344CB8AC3E}">
+        <p14:creationId xmlns:p14="http://schemas.microsoft.com/office/powerpoint/2010/main" val="3797218038"/>
+      </p:ext>
+    </p:extLst>
+  </p:cSld>
+  <p:clrMapOvr>
+    <a:masterClrMapping/>
+  </p:clrMapOvr>
+  <mc:AlternateContent xmlns:mc="http://schemas.openxmlformats.org/markup-compatibility/2006" xmlns:p14="http://schemas.microsoft.com/office/powerpoint/2010/main">
+    <mc:Choice Requires="p14">
+      <p:transition spd="med" p14:dur="700">
+        <p:fade/>
+      </p:transition>
+    </mc:Choice>
+    <mc:Fallback xmlns="">
+      <p:transition spd="med">
+        <p:fade/>
+      </p:transition>
+    </mc:Fallback>
+  </mc:AlternateContent>
+</p:sld>
+</file>
+
+<file path=ppt/slides/slide7.xml><?xml version="1.0" encoding="utf-8"?>
+<p:sld xmlns:a="http://schemas.openxmlformats.org/drawingml/2006/main" xmlns:r="http://schemas.openxmlformats.org/officeDocument/2006/relationships" xmlns:p="http://schemas.openxmlformats.org/presentationml/2006/main">
+  <p:cSld>
+    <p:spTree>
+      <p:nvGrpSpPr>
+        <p:cNvPr id="1" name=""/>
+        <p:cNvGrpSpPr/>
+        <p:nvPr/>
+      </p:nvGrpSpPr>
+      <p:grpSpPr>
+        <a:xfrm>
+          <a:off x="0" y="0"/>
+          <a:ext cx="0" cy="0"/>
+          <a:chOff x="0" y="0"/>
+          <a:chExt cx="0" cy="0"/>
+        </a:xfrm>
+      </p:grpSpPr>
+      <p:sp>
+        <p:nvSpPr>
+          <p:cNvPr id="5" name="Title 4">
+            <a:extLst>
+              <a:ext uri="{FF2B5EF4-FFF2-40B4-BE49-F238E27FC236}">
+                <a16:creationId xmlns:a16="http://schemas.microsoft.com/office/drawing/2014/main" id="{D0905275-2C3F-C740-B4C6-2E4A2060E93A}"/>
+              </a:ext>
+            </a:extLst>
+          </p:cNvPr>
+          <p:cNvSpPr>
+            <a:spLocks noGrp="1"/>
+          </p:cNvSpPr>
+          <p:nvPr>
+            <p:ph type="title"/>
+          </p:nvPr>
+        </p:nvSpPr>
+        <p:spPr/>
+        <p:txBody>
+          <a:bodyPr/>
+          <a:lstStyle/>
+          <a:p>
+            <a:r>
+              <a:rPr lang="en-US" dirty="0"/>
+              <a:t>Tableau vs D3.js</a:t>
+            </a:r>
+          </a:p>
+        </p:txBody>
+      </p:sp>
+      <p:sp>
+        <p:nvSpPr>
+          <p:cNvPr id="8" name="Slide Number Placeholder 5">
+            <a:extLst>
+              <a:ext uri="{FF2B5EF4-FFF2-40B4-BE49-F238E27FC236}">
+                <a16:creationId xmlns:a16="http://schemas.microsoft.com/office/drawing/2014/main" id="{25D23053-7992-9F47-90F7-4D13C92AEF9A}"/>
+              </a:ext>
+            </a:extLst>
+          </p:cNvPr>
+          <p:cNvSpPr>
+            <a:spLocks noGrp="1"/>
+          </p:cNvSpPr>
+          <p:nvPr>
+            <p:ph type="sldNum" sz="quarter" idx="12"/>
+          </p:nvPr>
+        </p:nvSpPr>
+        <p:spPr/>
+        <p:txBody>
+          <a:bodyPr/>
+          <a:lstStyle/>
+          <a:p>
+            <a:fld id="{535EF33A-04D8-4107-96E5-33B70AE88DFF}" type="slidenum">
+              <a:rPr lang="en-US" smtClean="0"/>
+              <a:pPr/>
+              <a:t>7</a:t>
             </a:fld>
             <a:endParaRPr lang="en-US" dirty="0"/>
           </a:p>
@@ -15022,398 +15305,7 @@
 </p:sld>
 </file>
 
-<file path=ppt/slides/slide7.xml><?xml version="1.0" encoding="utf-8"?>
-<p:sld xmlns:a="http://schemas.openxmlformats.org/drawingml/2006/main" xmlns:r="http://schemas.openxmlformats.org/officeDocument/2006/relationships" xmlns:p="http://schemas.openxmlformats.org/presentationml/2006/main">
-  <p:cSld>
-    <p:spTree>
-      <p:nvGrpSpPr>
-        <p:cNvPr id="1" name=""/>
-        <p:cNvGrpSpPr/>
-        <p:nvPr/>
-      </p:nvGrpSpPr>
-      <p:grpSpPr>
-        <a:xfrm>
-          <a:off x="0" y="0"/>
-          <a:ext cx="0" cy="0"/>
-          <a:chOff x="0" y="0"/>
-          <a:chExt cx="0" cy="0"/>
-        </a:xfrm>
-      </p:grpSpPr>
-      <p:sp>
-        <p:nvSpPr>
-          <p:cNvPr id="5" name="Title 4">
-            <a:extLst>
-              <a:ext uri="{FF2B5EF4-FFF2-40B4-BE49-F238E27FC236}">
-                <a16:creationId xmlns:a16="http://schemas.microsoft.com/office/drawing/2014/main" id="{D0905275-2C3F-C740-B4C6-2E4A2060E93A}"/>
-              </a:ext>
-            </a:extLst>
-          </p:cNvPr>
-          <p:cNvSpPr>
-            <a:spLocks noGrp="1"/>
-          </p:cNvSpPr>
-          <p:nvPr>
-            <p:ph type="title"/>
-          </p:nvPr>
-        </p:nvSpPr>
-        <p:spPr/>
-        <p:txBody>
-          <a:bodyPr/>
-          <a:lstStyle/>
-          <a:p>
-            <a:r>
-              <a:rPr lang="en-US" dirty="0"/>
-              <a:t>Conclusion</a:t>
-            </a:r>
-          </a:p>
-        </p:txBody>
-      </p:sp>
-      <p:sp>
-        <p:nvSpPr>
-          <p:cNvPr id="6" name="Content Placeholder 5">
-            <a:extLst>
-              <a:ext uri="{FF2B5EF4-FFF2-40B4-BE49-F238E27FC236}">
-                <a16:creationId xmlns:a16="http://schemas.microsoft.com/office/drawing/2014/main" id="{B100F3AF-4688-9845-865A-516B841DB928}"/>
-              </a:ext>
-            </a:extLst>
-          </p:cNvPr>
-          <p:cNvSpPr>
-            <a:spLocks noGrp="1"/>
-          </p:cNvSpPr>
-          <p:nvPr>
-            <p:ph idx="1"/>
-          </p:nvPr>
-        </p:nvSpPr>
-        <p:spPr>
-          <a:xfrm>
-            <a:off x="504827" y="1352551"/>
-            <a:ext cx="8134348" cy="3232150"/>
-          </a:xfrm>
-        </p:spPr>
-        <p:txBody>
-          <a:bodyPr>
-            <a:normAutofit/>
-          </a:bodyPr>
-          <a:lstStyle/>
-          <a:p>
-            <a:r>
-              <a:rPr lang="en-US" b="1" dirty="0">
-                <a:solidFill>
-                  <a:srgbClr val="0097D9"/>
-                </a:solidFill>
-              </a:rPr>
-              <a:t>Problem: </a:t>
-            </a:r>
-            <a:r>
-              <a:rPr lang="en-US" dirty="0" err="1"/>
-              <a:t>InformatiTek</a:t>
-            </a:r>
-            <a:r>
-              <a:rPr lang="en-US" dirty="0"/>
-              <a:t> needs to find a data visualization tool to bridge the gap between their analysts and developers</a:t>
-            </a:r>
-          </a:p>
-          <a:p>
-            <a:r>
-              <a:rPr lang="en-US" b="1" dirty="0">
-                <a:solidFill>
-                  <a:srgbClr val="0097D9"/>
-                </a:solidFill>
-              </a:rPr>
-              <a:t>Solution: </a:t>
-            </a:r>
-            <a:r>
-              <a:rPr lang="en-US" dirty="0"/>
-              <a:t>Demonstrate how the combination of Alteryx and Tableau are a more user friendly alternative to D3.js </a:t>
-            </a:r>
-          </a:p>
-          <a:p>
-            <a:r>
-              <a:rPr lang="en-US" b="1" dirty="0">
-                <a:solidFill>
-                  <a:srgbClr val="0097D9"/>
-                </a:solidFill>
-              </a:rPr>
-              <a:t>Value: </a:t>
-            </a:r>
-            <a:r>
-              <a:rPr lang="en-US" dirty="0"/>
-              <a:t>Alteryx and Tableau are complements of each other that have a smaller learning curve than d3.js to process, analyze, and visualize data.</a:t>
-            </a:r>
-          </a:p>
-        </p:txBody>
-      </p:sp>
-      <p:sp>
-        <p:nvSpPr>
-          <p:cNvPr id="8" name="Slide Number Placeholder 5">
-            <a:extLst>
-              <a:ext uri="{FF2B5EF4-FFF2-40B4-BE49-F238E27FC236}">
-                <a16:creationId xmlns:a16="http://schemas.microsoft.com/office/drawing/2014/main" id="{25D23053-7992-9F47-90F7-4D13C92AEF9A}"/>
-              </a:ext>
-            </a:extLst>
-          </p:cNvPr>
-          <p:cNvSpPr>
-            <a:spLocks noGrp="1"/>
-          </p:cNvSpPr>
-          <p:nvPr>
-            <p:ph type="sldNum" sz="quarter" idx="12"/>
-          </p:nvPr>
-        </p:nvSpPr>
-        <p:spPr/>
-        <p:txBody>
-          <a:bodyPr/>
-          <a:lstStyle/>
-          <a:p>
-            <a:fld id="{535EF33A-04D8-4107-96E5-33B70AE88DFF}" type="slidenum">
-              <a:rPr lang="en-US" smtClean="0"/>
-              <a:pPr/>
-              <a:t>7</a:t>
-            </a:fld>
-            <a:endParaRPr lang="en-US" dirty="0"/>
-          </a:p>
-        </p:txBody>
-      </p:sp>
-    </p:spTree>
-    <p:extLst>
-      <p:ext uri="{BB962C8B-B14F-4D97-AF65-F5344CB8AC3E}">
-        <p14:creationId xmlns:p14="http://schemas.microsoft.com/office/powerpoint/2010/main" val="4155900613"/>
-      </p:ext>
-    </p:extLst>
-  </p:cSld>
-  <p:clrMapOvr>
-    <a:masterClrMapping/>
-  </p:clrMapOvr>
-  <mc:AlternateContent xmlns:mc="http://schemas.openxmlformats.org/markup-compatibility/2006" xmlns:p14="http://schemas.microsoft.com/office/powerpoint/2010/main">
-    <mc:Choice Requires="p14">
-      <p:transition spd="med" p14:dur="700">
-        <p:fade/>
-      </p:transition>
-    </mc:Choice>
-    <mc:Fallback xmlns="">
-      <p:transition spd="med">
-        <p:fade/>
-      </p:transition>
-    </mc:Fallback>
-  </mc:AlternateContent>
-</p:sld>
-</file>
-
 <file path=ppt/slides/slide8.xml><?xml version="1.0" encoding="utf-8"?>
-<p:sld xmlns:a="http://schemas.openxmlformats.org/drawingml/2006/main" xmlns:r="http://schemas.openxmlformats.org/officeDocument/2006/relationships" xmlns:p="http://schemas.openxmlformats.org/presentationml/2006/main">
-  <p:cSld>
-    <p:spTree>
-      <p:nvGrpSpPr>
-        <p:cNvPr id="1" name=""/>
-        <p:cNvGrpSpPr/>
-        <p:nvPr/>
-      </p:nvGrpSpPr>
-      <p:grpSpPr>
-        <a:xfrm>
-          <a:off x="0" y="0"/>
-          <a:ext cx="0" cy="0"/>
-          <a:chOff x="0" y="0"/>
-          <a:chExt cx="0" cy="0"/>
-        </a:xfrm>
-      </p:grpSpPr>
-      <p:sp>
-        <p:nvSpPr>
-          <p:cNvPr id="5" name="Title 4">
-            <a:extLst>
-              <a:ext uri="{FF2B5EF4-FFF2-40B4-BE49-F238E27FC236}">
-                <a16:creationId xmlns:a16="http://schemas.microsoft.com/office/drawing/2014/main" id="{D0905275-2C3F-C740-B4C6-2E4A2060E93A}"/>
-              </a:ext>
-            </a:extLst>
-          </p:cNvPr>
-          <p:cNvSpPr>
-            <a:spLocks noGrp="1"/>
-          </p:cNvSpPr>
-          <p:nvPr>
-            <p:ph type="title"/>
-          </p:nvPr>
-        </p:nvSpPr>
-        <p:spPr/>
-        <p:txBody>
-          <a:bodyPr/>
-          <a:lstStyle/>
-          <a:p>
-            <a:r>
-              <a:rPr lang="en-US" dirty="0"/>
-              <a:t>Resources</a:t>
-            </a:r>
-          </a:p>
-        </p:txBody>
-      </p:sp>
-      <p:sp>
-        <p:nvSpPr>
-          <p:cNvPr id="6" name="Content Placeholder 5">
-            <a:extLst>
-              <a:ext uri="{FF2B5EF4-FFF2-40B4-BE49-F238E27FC236}">
-                <a16:creationId xmlns:a16="http://schemas.microsoft.com/office/drawing/2014/main" id="{B100F3AF-4688-9845-865A-516B841DB928}"/>
-              </a:ext>
-            </a:extLst>
-          </p:cNvPr>
-          <p:cNvSpPr>
-            <a:spLocks noGrp="1"/>
-          </p:cNvSpPr>
-          <p:nvPr>
-            <p:ph idx="1"/>
-          </p:nvPr>
-        </p:nvSpPr>
-        <p:spPr>
-          <a:xfrm>
-            <a:off x="504827" y="1352551"/>
-            <a:ext cx="8134348" cy="3232150"/>
-          </a:xfrm>
-        </p:spPr>
-        <p:txBody>
-          <a:bodyPr>
-            <a:normAutofit/>
-          </a:bodyPr>
-          <a:lstStyle/>
-          <a:p>
-            <a:r>
-              <a:rPr lang="en-US" b="1" dirty="0">
-                <a:solidFill>
-                  <a:srgbClr val="0097D9"/>
-                </a:solidFill>
-              </a:rPr>
-              <a:t>US State Sizes: </a:t>
-            </a:r>
-            <a:r>
-              <a:rPr lang="en-US" dirty="0">
-                <a:hlinkClick r:id="rId2"/>
-              </a:rPr>
-              <a:t>https://github.com/jakevdp/data-USstates/blob/master/state-areas.csv</a:t>
-            </a:r>
-            <a:endParaRPr lang="en-US" dirty="0"/>
-          </a:p>
-          <a:p>
-            <a:r>
-              <a:rPr lang="en-US" b="1" dirty="0">
-                <a:solidFill>
-                  <a:srgbClr val="0097D9"/>
-                </a:solidFill>
-              </a:rPr>
-              <a:t>Nursing Home Stats: </a:t>
-            </a:r>
-            <a:r>
-              <a:rPr lang="en-US" dirty="0">
-                <a:hlinkClick r:id="rId3"/>
-              </a:rPr>
-              <a:t>https://data.cms.gov/provider-data/search?theme=Nursing%20homes%20including%20rehab%20services</a:t>
-            </a:r>
-            <a:endParaRPr lang="en-US" dirty="0"/>
-          </a:p>
-          <a:p>
-            <a:r>
-              <a:rPr lang="en-US" b="1" dirty="0">
-                <a:solidFill>
-                  <a:srgbClr val="0097D9"/>
-                </a:solidFill>
-              </a:rPr>
-              <a:t>US Population: </a:t>
-            </a:r>
-            <a:r>
-              <a:rPr lang="en-US" dirty="0">
-                <a:hlinkClick r:id="rId4"/>
-              </a:rPr>
-              <a:t>https://www.census.gov/data/tables/time-series/demo/popest/2010s-state-total.html</a:t>
-            </a:r>
-            <a:endParaRPr lang="en-US" dirty="0"/>
-          </a:p>
-          <a:p>
-            <a:r>
-              <a:rPr lang="en-US" b="1" dirty="0">
-                <a:solidFill>
-                  <a:srgbClr val="0097D9"/>
-                </a:solidFill>
-              </a:rPr>
-              <a:t>Nursing Home Rating Terms and explanations: </a:t>
-            </a:r>
-          </a:p>
-          <a:p>
-            <a:pPr lvl="1"/>
-            <a:r>
-              <a:rPr lang="en-US" dirty="0">
-                <a:hlinkClick r:id="rId5"/>
-              </a:rPr>
-              <a:t>https://www.cms.gov/Medicare/Provider-Enrollment-and-Certification/CertificationandComplianc/FSQRS#:~:text=Quality%20Measures%20(QMs)%20%E2%80%93%20The,residents'%20physical%20and%20clinical%20needs</a:t>
-            </a:r>
-            <a:r>
-              <a:rPr lang="en-US" dirty="0"/>
-              <a:t>.</a:t>
-            </a:r>
-          </a:p>
-          <a:p>
-            <a:pPr lvl="1"/>
-            <a:r>
-              <a:rPr lang="en-US" dirty="0">
-                <a:solidFill>
-                  <a:srgbClr val="0097D9"/>
-                </a:solidFill>
-                <a:hlinkClick r:id="rId6"/>
-              </a:rPr>
-              <a:t>https://health.mo.gov/safety/nursinghomesinspected/index.php</a:t>
-            </a:r>
-            <a:endParaRPr lang="en-US" dirty="0"/>
-          </a:p>
-        </p:txBody>
-      </p:sp>
-      <p:sp>
-        <p:nvSpPr>
-          <p:cNvPr id="8" name="Slide Number Placeholder 5">
-            <a:extLst>
-              <a:ext uri="{FF2B5EF4-FFF2-40B4-BE49-F238E27FC236}">
-                <a16:creationId xmlns:a16="http://schemas.microsoft.com/office/drawing/2014/main" id="{25D23053-7992-9F47-90F7-4D13C92AEF9A}"/>
-              </a:ext>
-            </a:extLst>
-          </p:cNvPr>
-          <p:cNvSpPr>
-            <a:spLocks noGrp="1"/>
-          </p:cNvSpPr>
-          <p:nvPr>
-            <p:ph type="sldNum" sz="quarter" idx="12"/>
-          </p:nvPr>
-        </p:nvSpPr>
-        <p:spPr/>
-        <p:txBody>
-          <a:bodyPr/>
-          <a:lstStyle/>
-          <a:p>
-            <a:fld id="{535EF33A-04D8-4107-96E5-33B70AE88DFF}" type="slidenum">
-              <a:rPr lang="en-US" smtClean="0"/>
-              <a:pPr/>
-              <a:t>8</a:t>
-            </a:fld>
-            <a:endParaRPr lang="en-US" dirty="0"/>
-          </a:p>
-        </p:txBody>
-      </p:sp>
-    </p:spTree>
-    <p:extLst>
-      <p:ext uri="{BB962C8B-B14F-4D97-AF65-F5344CB8AC3E}">
-        <p14:creationId xmlns:p14="http://schemas.microsoft.com/office/powerpoint/2010/main" val="1606140614"/>
-      </p:ext>
-    </p:extLst>
-  </p:cSld>
-  <p:clrMapOvr>
-    <a:masterClrMapping/>
-  </p:clrMapOvr>
-  <mc:AlternateContent xmlns:mc="http://schemas.openxmlformats.org/markup-compatibility/2006">
-    <mc:Choice xmlns:p14="http://schemas.microsoft.com/office/powerpoint/2010/main" Requires="p14">
-      <p:transition spd="med" p14:dur="700">
-        <p:fade/>
-      </p:transition>
-    </mc:Choice>
-    <mc:Fallback>
-      <p:transition spd="med">
-        <p:fade/>
-      </p:transition>
-    </mc:Fallback>
-  </mc:AlternateContent>
-</p:sld>
-</file>
-
-<file path=ppt/slides/slide9.xml><?xml version="1.0" encoding="utf-8"?>
 <p:sld xmlns:a="http://schemas.openxmlformats.org/drawingml/2006/main" xmlns:r="http://schemas.openxmlformats.org/officeDocument/2006/relationships" xmlns:p="http://schemas.openxmlformats.org/presentationml/2006/main">
   <p:cSld>
     <p:spTree>
@@ -16345,6 +16237,15 @@
 </file>
 
 <file path=customXml/item2.xml><?xml version="1.0" encoding="utf-8"?>
+<?mso-contentType ?>
+<FormTemplates xmlns="http://schemas.microsoft.com/sharepoint/v3/contenttype/forms">
+  <Display>DocumentLibraryForm</Display>
+  <Edit>DocumentLibraryForm</Edit>
+  <New>DocumentLibraryForm</New>
+</FormTemplates>
+</file>
+
+<file path=customXml/item3.xml><?xml version="1.0" encoding="utf-8"?>
 <ct:contentTypeSchema xmlns:ct="http://schemas.microsoft.com/office/2006/metadata/contentType" xmlns:ma="http://schemas.microsoft.com/office/2006/metadata/properties/metaAttributes" ct:_="" ma:_="" ma:contentTypeName="Document" ma:contentTypeID="0x010100FEF7458C51E57141848015B90E19E3FF" ma:contentTypeVersion="7" ma:contentTypeDescription="Create a new document." ma:contentTypeScope="" ma:versionID="83f648d576e601b92f7142a7f572c300">
   <xsd:schema xmlns:xsd="http://www.w3.org/2001/XMLSchema" xmlns:xs="http://www.w3.org/2001/XMLSchema" xmlns:p="http://schemas.microsoft.com/office/2006/metadata/properties" xmlns:ns2="d2a9f884-c2eb-4182-8d97-b2c1069a1e77" xmlns:ns3="ad1dcd44-2c79-421e-996d-e07b6b6a06b7" targetNamespace="http://schemas.microsoft.com/office/2006/metadata/properties" ma:root="true" ma:fieldsID="0d22376f87372475b46127375c8e888e" ns2:_="" ns3:_="">
     <xsd:import namespace="d2a9f884-c2eb-4182-8d97-b2c1069a1e77"/>
@@ -16529,15 +16430,6 @@
 </ct:contentTypeSchema>
 </file>
 
-<file path=customXml/item3.xml><?xml version="1.0" encoding="utf-8"?>
-<?mso-contentType ?>
-<FormTemplates xmlns="http://schemas.microsoft.com/sharepoint/v3/contenttype/forms">
-  <Display>DocumentLibraryForm</Display>
-  <Edit>DocumentLibraryForm</Edit>
-  <New>DocumentLibraryForm</New>
-</FormTemplates>
-</file>
-
 <file path=customXml/itemProps1.xml><?xml version="1.0" encoding="utf-8"?>
 <ds:datastoreItem xmlns:ds="http://schemas.openxmlformats.org/officeDocument/2006/customXml" ds:itemID="{E3F0252B-B6E9-4221-B01E-0247E154DC26}">
   <ds:schemaRefs>
@@ -16556,6 +16448,14 @@
 </file>
 
 <file path=customXml/itemProps2.xml><?xml version="1.0" encoding="utf-8"?>
+<ds:datastoreItem xmlns:ds="http://schemas.openxmlformats.org/officeDocument/2006/customXml" ds:itemID="{F11117D9-2152-408D-8EA9-A138D8484626}">
+  <ds:schemaRefs>
+    <ds:schemaRef ds:uri="http://schemas.microsoft.com/sharepoint/v3/contenttype/forms"/>
+  </ds:schemaRefs>
+</ds:datastoreItem>
+</file>
+
+<file path=customXml/itemProps3.xml><?xml version="1.0" encoding="utf-8"?>
 <ds:datastoreItem xmlns:ds="http://schemas.openxmlformats.org/officeDocument/2006/customXml" ds:itemID="{6062DE58-109F-4D2D-8F00-D49A02B03B4B}">
   <ds:schemaRefs>
     <ds:schemaRef ds:uri="http://schemas.microsoft.com/office/2006/metadata/contentType"/>
@@ -16572,12 +16472,4 @@
     <ds:schemaRef ds:uri="http://schemas.microsoft.com/internal/obd"/>
   </ds:schemaRefs>
 </ds:datastoreItem>
-</file>
-
-<file path=customXml/itemProps3.xml><?xml version="1.0" encoding="utf-8"?>
-<ds:datastoreItem xmlns:ds="http://schemas.openxmlformats.org/officeDocument/2006/customXml" ds:itemID="{F11117D9-2152-408D-8EA9-A138D8484626}">
-  <ds:schemaRefs>
-    <ds:schemaRef ds:uri="http://schemas.microsoft.com/sharepoint/v3/contenttype/forms"/>
-  </ds:schemaRefs>
-</ds:datastoreItem>
 </file>
</xml_diff>

<commit_message>
fix filter and organize slides
</commit_message>
<xml_diff>
--- a/InformatiTekRFP.pptx
+++ b/InformatiTekRFP.pptx
@@ -253,7 +253,7 @@
           <a:p>
             <a:fld id="{500BE106-9E8F-5E4B-8372-DEE3BFEF72D4}" type="datetimeFigureOut">
               <a:rPr lang="en-US" smtClean="0"/>
-              <a:t>5/6/2021</a:t>
+              <a:t>5/7/2021</a:t>
             </a:fld>
             <a:endParaRPr lang="en-US" dirty="0"/>
           </a:p>
@@ -430,7 +430,7 @@
           <a:p>
             <a:fld id="{78C78EF0-0DF0-8442-8A08-5681612D9C6F}" type="datetimeFigureOut">
               <a:rPr lang="en-US" smtClean="0"/>
-              <a:t>5/6/2021</a:t>
+              <a:t>5/7/2021</a:t>
             </a:fld>
             <a:endParaRPr lang="en-US" dirty="0"/>
           </a:p>
@@ -14292,16 +14292,6 @@
               <a:t>Tableau Demonstration and Analysis</a:t>
             </a:r>
           </a:p>
-          <a:p>
-            <a:r>
-              <a:rPr lang="en-US" b="1" dirty="0">
-                <a:solidFill>
-                  <a:srgbClr val="0097D9"/>
-                </a:solidFill>
-              </a:rPr>
-              <a:t>Conclusion</a:t>
-            </a:r>
-          </a:p>
         </p:txBody>
       </p:sp>
       <p:sp>
@@ -14462,7 +14452,7 @@
             <a:pPr lvl="1"/>
             <a:r>
               <a:rPr lang="en-US" dirty="0"/>
-              <a:t>As parents get older, we need to start preparing for what happens as they are no longer able to perform their ADLs (activities of daily living). At that point, we need to start weighing the options between having an at home caregiver to allow them to age in place or finding a nursing home. This can be an overwhelming decision so finding the factors that determine a successful nursing home via visuals will help draw prospects to our business as well as aid in our own decisions.</a:t>
+              <a:t>Our nation begins to age, we will start being the care taker of older adults in our lives. We need to start preparing for what happens as they are no longer able to perform their ADLs (activities of daily living). At that point, we need to start weighing the options between having an at home caregiver to allow them to age in place or finding a nursing home. This can be an overwhelming decision so finding the factors that determine a successful nursing home via visuals will help draw prospects to our business as well as aid in our own decisions.</a:t>
             </a:r>
             <a:endParaRPr lang="en-US" b="1" dirty="0">
               <a:solidFill>
@@ -14804,10 +14794,10 @@
       </p:sp>
       <p:pic>
         <p:nvPicPr>
-          <p:cNvPr id="4" name="Picture 3">
-            <a:extLst>
-              <a:ext uri="{FF2B5EF4-FFF2-40B4-BE49-F238E27FC236}">
-                <a16:creationId xmlns:a16="http://schemas.microsoft.com/office/drawing/2014/main" id="{F907DE88-7BC2-4B17-96EB-D5B52C79006A}"/>
+          <p:cNvPr id="3" name="Picture 2">
+            <a:extLst>
+              <a:ext uri="{FF2B5EF4-FFF2-40B4-BE49-F238E27FC236}">
+                <a16:creationId xmlns:a16="http://schemas.microsoft.com/office/drawing/2014/main" id="{D6F6F6C5-C12E-47C8-9D7C-A4BF142EF53F}"/>
               </a:ext>
             </a:extLst>
           </p:cNvPr>
@@ -14824,8 +14814,8 @@
         </p:blipFill>
         <p:spPr>
           <a:xfrm>
-            <a:off x="862011" y="1660358"/>
-            <a:ext cx="7419975" cy="2400300"/>
+            <a:off x="1051097" y="1234679"/>
+            <a:ext cx="7041804" cy="3527633"/>
           </a:xfrm>
           <a:prstGeom prst="rect">
             <a:avLst/>

</xml_diff>